<commit_message>
cp7f start, edit slides7f, add slides7m-macb 7f-updated 8m 8m-hall
</commit_message>
<xml_diff>
--- a/spring10/slides10/slides7m.pptx
+++ b/spring10/slides10/slides7m.pptx
@@ -10484,13 +10484,7 @@
               <a:rPr lang="en-US" sz="5400" i="1" smtClean="0">
                 <a:sym typeface="Euclid Symbol" pitchFamily="18" charset="2"/>
               </a:rPr>
-              <a:t>lemma</a:t>
-            </a:r>
-            <a:r>
-              <a:rPr lang="en-US" sz="5400" i="1" smtClean="0">
-                <a:sym typeface="Euclid Symbol" pitchFamily="18" charset="2"/>
-              </a:rPr>
-              <a:t>:</a:t>
+              <a:t>lemma:</a:t>
             </a:r>
             <a:endParaRPr lang="en-US" sz="6000" i="1" smtClean="0">
               <a:sym typeface="Euclid Symbol" pitchFamily="18" charset="2"/>
@@ -42440,7 +42434,7 @@
 </file>
 
 <file path=ppt/slides/slide48.xml><?xml version="1.0" encoding="utf-8"?>
-<p:sld xmlns:a="http://schemas.openxmlformats.org/drawingml/2006/main" xmlns:r="http://schemas.openxmlformats.org/officeDocument/2006/relationships" xmlns:mc="http://schemas.openxmlformats.org/markup-compatibility/2006" xmlns:mv="urn:schemas-microsoft-com:mac:vml" xmlns:p="http://schemas.openxmlformats.org/presentationml/2006/main" mc:Ignorable="mv" mc:PreserveAttributes="mv:*">
+<p:sld xmlns:a="http://schemas.openxmlformats.org/drawingml/2006/main" xmlns:r="http://schemas.openxmlformats.org/officeDocument/2006/relationships" xmlns:mc="http://schemas.openxmlformats.org/markup-compatibility/2006" xmlns:mv="urn:schemas-microsoft-com:mac:vml" xmlns:p="http://schemas.openxmlformats.org/presentationml/2006/main" mc:Ignorable="mv" mc:PreserveAttributes="mv:*" show="0">
   <p:cSld>
     <p:spTree>
       <p:nvGrpSpPr>
@@ -43050,7 +43044,7 @@
                 <a:latin typeface="Comic Sans MS" pitchFamily="8" charset="0"/>
                 <a:sym typeface="Euclid Symbol" pitchFamily="18" charset="2"/>
               </a:rPr>
-              <a:t>N</a:t>
+              <a:t>|N</a:t>
             </a:r>
             <a:r>
               <a:rPr lang="en-US" sz="4400" dirty="0" err="1">
@@ -43198,6 +43192,7 @@
   <p:clrMapOvr>
     <a:masterClrMapping/>
   </p:clrMapOvr>
+  <p:transition/>
   <p:timing>
     <p:tnLst>
       <p:par>

</xml_diff>